<commit_message>
research w and t
</commit_message>
<xml_diff>
--- a/Presentation без рез.pptx
+++ b/Presentation без рез.pptx
@@ -5630,8 +5630,8 @@
         </p:nvSpPr>
         <p:spPr>
           <a:xfrm>
-            <a:off x="1601431" y="1951201"/>
-            <a:ext cx="5941138" cy="2037600"/>
+            <a:off x="1161757" y="3105900"/>
+            <a:ext cx="6820485" cy="2037600"/>
           </a:xfrm>
           <a:prstGeom prst="rect">
             <a:avLst/>
@@ -5643,36 +5643,13 @@
           </a:bodyPr>
           <a:lstStyle/>
           <a:p>
-            <a:pPr marL="0" lvl="0" indent="0" rtl="0">
-              <a:spcBef>
-                <a:spcPts val="0"/>
-              </a:spcBef>
-              <a:spcAft>
-                <a:spcPts val="0"/>
-              </a:spcAft>
-              <a:buNone/>
-            </a:pPr>
             <a:r>
-              <a:rPr lang="ru-RU" sz="3200" dirty="0">
-                <a:latin typeface="Palatino Linotype" panose="02040502050505030304" pitchFamily="18" charset="0"/>
-                <a:cs typeface="AngsanaUPC" panose="020B0502040204020203" pitchFamily="18" charset="-34"/>
-              </a:rPr>
-              <a:t>Построение графа для фермента </a:t>
+              <a:rPr lang="ru-RU" sz="2400" b="1" cap="all" dirty="0"/>
+              <a:t>оценка времени дожития пациентов с боковым амиотрофическим склерозом на основе характеристик графа водородных связей</a:t>
             </a:r>
-            <a:r>
-              <a:rPr lang="en-CA" sz="3200" dirty="0">
-                <a:latin typeface="Palatino Linotype" panose="02040502050505030304" pitchFamily="18" charset="0"/>
-                <a:cs typeface="AngsanaUPC" panose="020B0502040204020203" pitchFamily="18" charset="-34"/>
-              </a:rPr>
-              <a:t>SOD1</a:t>
-            </a:r>
-            <a:r>
-              <a:rPr lang="ru-RU" sz="3200" dirty="0">
-                <a:latin typeface="Palatino Linotype" panose="02040502050505030304" pitchFamily="18" charset="0"/>
-                <a:cs typeface="AngsanaUPC" panose="020B0502040204020203" pitchFamily="18" charset="-34"/>
-              </a:rPr>
-              <a:t>. </a:t>
-            </a:r>
+            <a:br>
+              <a:rPr lang="ru-RU" b="1" cap="all" dirty="0"/>
+            </a:br>
             <a:br>
               <a:rPr lang="ru-RU" dirty="0">
                 <a:latin typeface="Tiger Expert" panose="02070300020205020404" pitchFamily="18" charset="0"/>
@@ -5700,12 +5677,20 @@
             <p:ph type="subTitle" idx="1"/>
           </p:nvPr>
         </p:nvSpPr>
-        <p:spPr/>
+        <p:spPr>
+          <a:xfrm>
+            <a:off x="3147900" y="3473551"/>
+            <a:ext cx="2473800" cy="477300"/>
+          </a:xfrm>
+        </p:spPr>
         <p:txBody>
           <a:bodyPr/>
           <a:lstStyle/>
           <a:p>
-            <a:endParaRPr lang="ru-RU"/>
+            <a:r>
+              <a:rPr lang="ru-RU" dirty="0"/>
+              <a:t>Воронкина Д.К</a:t>
+            </a:r>
           </a:p>
         </p:txBody>
       </p:sp>

</xml_diff>